<commit_message>
Adjust image widths, and add a new figure for component hierarchy.
</commit_message>
<xml_diff>
--- a/figures.pptx
+++ b/figures.pptx
@@ -7,6 +7,7 @@
   <p:sldIdLst>
     <p:sldId id="256" r:id="rId2"/>
     <p:sldId id="257" r:id="rId3"/>
+    <p:sldId id="258" r:id="rId4"/>
   </p:sldIdLst>
   <p:sldSz cx="12192000" cy="6858000"/>
   <p:notesSz cx="6858000" cy="9144000"/>
@@ -105,6 +106,11 @@
       </a:defRPr>
     </a:lvl9pPr>
   </p:defaultTextStyle>
+  <p:extLst>
+    <p:ext uri="{EFAFB233-063F-42B5-8137-9DF3F51BA10A}">
+      <p15:sldGuideLst xmlns:p15="http://schemas.microsoft.com/office/powerpoint/2012/main"/>
+    </p:ext>
+  </p:extLst>
 </p:presentation>
 </file>
 
@@ -239,7 +245,7 @@
           <a:p>
             <a:fld id="{BBC8513F-113F-4BCE-92C2-45ABCAB37C51}" type="datetimeFigureOut">
               <a:rPr lang="en-US" smtClean="0"/>
-              <a:t>3/27/2015</a:t>
+              <a:t>3/28/2015</a:t>
             </a:fld>
             <a:endParaRPr lang="en-US"/>
           </a:p>
@@ -409,7 +415,7 @@
           <a:p>
             <a:fld id="{BBC8513F-113F-4BCE-92C2-45ABCAB37C51}" type="datetimeFigureOut">
               <a:rPr lang="en-US" smtClean="0"/>
-              <a:t>3/27/2015</a:t>
+              <a:t>3/28/2015</a:t>
             </a:fld>
             <a:endParaRPr lang="en-US"/>
           </a:p>
@@ -589,7 +595,7 @@
           <a:p>
             <a:fld id="{BBC8513F-113F-4BCE-92C2-45ABCAB37C51}" type="datetimeFigureOut">
               <a:rPr lang="en-US" smtClean="0"/>
-              <a:t>3/27/2015</a:t>
+              <a:t>3/28/2015</a:t>
             </a:fld>
             <a:endParaRPr lang="en-US"/>
           </a:p>
@@ -759,7 +765,7 @@
           <a:p>
             <a:fld id="{BBC8513F-113F-4BCE-92C2-45ABCAB37C51}" type="datetimeFigureOut">
               <a:rPr lang="en-US" smtClean="0"/>
-              <a:t>3/27/2015</a:t>
+              <a:t>3/28/2015</a:t>
             </a:fld>
             <a:endParaRPr lang="en-US"/>
           </a:p>
@@ -1005,7 +1011,7 @@
           <a:p>
             <a:fld id="{BBC8513F-113F-4BCE-92C2-45ABCAB37C51}" type="datetimeFigureOut">
               <a:rPr lang="en-US" smtClean="0"/>
-              <a:t>3/27/2015</a:t>
+              <a:t>3/28/2015</a:t>
             </a:fld>
             <a:endParaRPr lang="en-US"/>
           </a:p>
@@ -1237,7 +1243,7 @@
           <a:p>
             <a:fld id="{BBC8513F-113F-4BCE-92C2-45ABCAB37C51}" type="datetimeFigureOut">
               <a:rPr lang="en-US" smtClean="0"/>
-              <a:t>3/27/2015</a:t>
+              <a:t>3/28/2015</a:t>
             </a:fld>
             <a:endParaRPr lang="en-US"/>
           </a:p>
@@ -1604,7 +1610,7 @@
           <a:p>
             <a:fld id="{BBC8513F-113F-4BCE-92C2-45ABCAB37C51}" type="datetimeFigureOut">
               <a:rPr lang="en-US" smtClean="0"/>
-              <a:t>3/27/2015</a:t>
+              <a:t>3/28/2015</a:t>
             </a:fld>
             <a:endParaRPr lang="en-US"/>
           </a:p>
@@ -1722,7 +1728,7 @@
           <a:p>
             <a:fld id="{BBC8513F-113F-4BCE-92C2-45ABCAB37C51}" type="datetimeFigureOut">
               <a:rPr lang="en-US" smtClean="0"/>
-              <a:t>3/27/2015</a:t>
+              <a:t>3/28/2015</a:t>
             </a:fld>
             <a:endParaRPr lang="en-US"/>
           </a:p>
@@ -1817,7 +1823,7 @@
           <a:p>
             <a:fld id="{BBC8513F-113F-4BCE-92C2-45ABCAB37C51}" type="datetimeFigureOut">
               <a:rPr lang="en-US" smtClean="0"/>
-              <a:t>3/27/2015</a:t>
+              <a:t>3/28/2015</a:t>
             </a:fld>
             <a:endParaRPr lang="en-US"/>
           </a:p>
@@ -2094,7 +2100,7 @@
           <a:p>
             <a:fld id="{BBC8513F-113F-4BCE-92C2-45ABCAB37C51}" type="datetimeFigureOut">
               <a:rPr lang="en-US" smtClean="0"/>
-              <a:t>3/27/2015</a:t>
+              <a:t>3/28/2015</a:t>
             </a:fld>
             <a:endParaRPr lang="en-US"/>
           </a:p>
@@ -2347,7 +2353,7 @@
           <a:p>
             <a:fld id="{BBC8513F-113F-4BCE-92C2-45ABCAB37C51}" type="datetimeFigureOut">
               <a:rPr lang="en-US" smtClean="0"/>
-              <a:t>3/27/2015</a:t>
+              <a:t>3/28/2015</a:t>
             </a:fld>
             <a:endParaRPr lang="en-US"/>
           </a:p>
@@ -2560,7 +2566,7 @@
           <a:p>
             <a:fld id="{BBC8513F-113F-4BCE-92C2-45ABCAB37C51}" type="datetimeFigureOut">
               <a:rPr lang="en-US" smtClean="0"/>
-              <a:t>3/27/2015</a:t>
+              <a:t>3/28/2015</a:t>
             </a:fld>
             <a:endParaRPr lang="en-US"/>
           </a:p>
@@ -3520,6 +3526,1330 @@
 </p:sld>
 </file>
 
+<file path=ppt/slides/slide3.xml><?xml version="1.0" encoding="utf-8"?>
+<p:sld xmlns:a="http://schemas.openxmlformats.org/drawingml/2006/main" xmlns:r="http://schemas.openxmlformats.org/officeDocument/2006/relationships" xmlns:p="http://schemas.openxmlformats.org/presentationml/2006/main">
+  <p:cSld>
+    <p:spTree>
+      <p:nvGrpSpPr>
+        <p:cNvPr id="1" name=""/>
+        <p:cNvGrpSpPr/>
+        <p:nvPr/>
+      </p:nvGrpSpPr>
+      <p:grpSpPr>
+        <a:xfrm>
+          <a:off x="0" y="0"/>
+          <a:ext cx="0" cy="0"/>
+          <a:chOff x="0" y="0"/>
+          <a:chExt cx="0" cy="0"/>
+        </a:xfrm>
+      </p:grpSpPr>
+      <p:sp>
+        <p:nvSpPr>
+          <p:cNvPr id="2" name="Rounded Rectangle 1"/>
+          <p:cNvSpPr/>
+          <p:nvPr/>
+        </p:nvSpPr>
+        <p:spPr>
+          <a:xfrm>
+            <a:off x="4691269" y="326003"/>
+            <a:ext cx="2266122" cy="381663"/>
+          </a:xfrm>
+          <a:prstGeom prst="roundRect">
+            <a:avLst/>
+          </a:prstGeom>
+        </p:spPr>
+        <p:style>
+          <a:lnRef idx="1">
+            <a:schemeClr val="accent3"/>
+          </a:lnRef>
+          <a:fillRef idx="1003">
+            <a:schemeClr val="lt1"/>
+          </a:fillRef>
+          <a:effectRef idx="1">
+            <a:schemeClr val="accent3"/>
+          </a:effectRef>
+          <a:fontRef idx="minor">
+            <a:schemeClr val="dk1"/>
+          </a:fontRef>
+        </p:style>
+        <p:txBody>
+          <a:bodyPr rtlCol="0" anchor="ctr"/>
+          <a:lstStyle/>
+          <a:p>
+            <a:pPr algn="ctr"/>
+            <a:r>
+              <a:rPr lang="en-US" sz="1400" dirty="0" smtClean="0">
+                <a:latin typeface="Consolas" panose="020B0609020204030204" pitchFamily="49" charset="0"/>
+                <a:cs typeface="Consolas" panose="020B0609020204030204" pitchFamily="49" charset="0"/>
+              </a:rPr>
+              <a:t>&lt;speaker-discussion&gt;</a:t>
+            </a:r>
+          </a:p>
+        </p:txBody>
+      </p:sp>
+      <p:sp>
+        <p:nvSpPr>
+          <p:cNvPr id="4" name="Rounded Rectangle 3"/>
+          <p:cNvSpPr/>
+          <p:nvPr/>
+        </p:nvSpPr>
+        <p:spPr>
+          <a:xfrm>
+            <a:off x="1549178" y="1130406"/>
+            <a:ext cx="2520565" cy="381663"/>
+          </a:xfrm>
+          <a:prstGeom prst="roundRect">
+            <a:avLst/>
+          </a:prstGeom>
+        </p:spPr>
+        <p:style>
+          <a:lnRef idx="1">
+            <a:schemeClr val="accent3"/>
+          </a:lnRef>
+          <a:fillRef idx="1003">
+            <a:schemeClr val="lt1"/>
+          </a:fillRef>
+          <a:effectRef idx="1">
+            <a:schemeClr val="accent3"/>
+          </a:effectRef>
+          <a:fontRef idx="minor">
+            <a:schemeClr val="dk1"/>
+          </a:fontRef>
+        </p:style>
+        <p:txBody>
+          <a:bodyPr rtlCol="0" anchor="ctr"/>
+          <a:lstStyle/>
+          <a:p>
+            <a:pPr algn="ctr"/>
+            <a:r>
+              <a:rPr lang="en-US" sz="1400" dirty="0" smtClean="0">
+                <a:latin typeface="Consolas" panose="020B0609020204030204" pitchFamily="49" charset="0"/>
+                <a:cs typeface="Consolas" panose="020B0609020204030204" pitchFamily="49" charset="0"/>
+              </a:rPr>
+              <a:t>&lt;speaker-profile&gt;</a:t>
+            </a:r>
+          </a:p>
+        </p:txBody>
+      </p:sp>
+      <p:sp>
+        <p:nvSpPr>
+          <p:cNvPr id="5" name="Rounded Rectangle 4"/>
+          <p:cNvSpPr/>
+          <p:nvPr/>
+        </p:nvSpPr>
+        <p:spPr>
+          <a:xfrm>
+            <a:off x="4564047" y="1130407"/>
+            <a:ext cx="2520565" cy="381663"/>
+          </a:xfrm>
+          <a:prstGeom prst="roundRect">
+            <a:avLst/>
+          </a:prstGeom>
+        </p:spPr>
+        <p:style>
+          <a:lnRef idx="1">
+            <a:schemeClr val="accent3"/>
+          </a:lnRef>
+          <a:fillRef idx="1003">
+            <a:schemeClr val="lt1"/>
+          </a:fillRef>
+          <a:effectRef idx="1">
+            <a:schemeClr val="accent3"/>
+          </a:effectRef>
+          <a:fontRef idx="minor">
+            <a:schemeClr val="dk1"/>
+          </a:fontRef>
+        </p:style>
+        <p:txBody>
+          <a:bodyPr rtlCol="0" anchor="ctr"/>
+          <a:lstStyle/>
+          <a:p>
+            <a:pPr algn="ctr"/>
+            <a:r>
+              <a:rPr lang="en-US" sz="1400" dirty="0" smtClean="0">
+                <a:latin typeface="Consolas" panose="020B0609020204030204" pitchFamily="49" charset="0"/>
+                <a:cs typeface="Consolas" panose="020B0609020204030204" pitchFamily="49" charset="0"/>
+              </a:rPr>
+              <a:t>&lt;speaker-thread-view&gt;</a:t>
+            </a:r>
+          </a:p>
+        </p:txBody>
+      </p:sp>
+      <p:sp>
+        <p:nvSpPr>
+          <p:cNvPr id="6" name="Rounded Rectangle 5"/>
+          <p:cNvSpPr/>
+          <p:nvPr/>
+        </p:nvSpPr>
+        <p:spPr>
+          <a:xfrm>
+            <a:off x="7578916" y="1130407"/>
+            <a:ext cx="2520565" cy="381663"/>
+          </a:xfrm>
+          <a:prstGeom prst="roundRect">
+            <a:avLst/>
+          </a:prstGeom>
+        </p:spPr>
+        <p:style>
+          <a:lnRef idx="1">
+            <a:schemeClr val="accent3"/>
+          </a:lnRef>
+          <a:fillRef idx="1003">
+            <a:schemeClr val="lt1"/>
+          </a:fillRef>
+          <a:effectRef idx="1">
+            <a:schemeClr val="accent3"/>
+          </a:effectRef>
+          <a:fontRef idx="minor">
+            <a:schemeClr val="dk1"/>
+          </a:fontRef>
+        </p:style>
+        <p:txBody>
+          <a:bodyPr rtlCol="0" anchor="ctr"/>
+          <a:lstStyle/>
+          <a:p>
+            <a:pPr algn="ctr"/>
+            <a:r>
+              <a:rPr lang="en-US" sz="1400" dirty="0" smtClean="0">
+                <a:latin typeface="Consolas" panose="020B0609020204030204" pitchFamily="49" charset="0"/>
+                <a:cs typeface="Consolas" panose="020B0609020204030204" pitchFamily="49" charset="0"/>
+              </a:rPr>
+              <a:t>&lt;speaker-i18next&gt;</a:t>
+            </a:r>
+          </a:p>
+        </p:txBody>
+      </p:sp>
+      <p:sp>
+        <p:nvSpPr>
+          <p:cNvPr id="7" name="Rounded Rectangle 6"/>
+          <p:cNvSpPr/>
+          <p:nvPr/>
+        </p:nvSpPr>
+        <p:spPr>
+          <a:xfrm>
+            <a:off x="1637967" y="2474180"/>
+            <a:ext cx="2520565" cy="381663"/>
+          </a:xfrm>
+          <a:prstGeom prst="roundRect">
+            <a:avLst/>
+          </a:prstGeom>
+        </p:spPr>
+        <p:style>
+          <a:lnRef idx="1">
+            <a:schemeClr val="accent3"/>
+          </a:lnRef>
+          <a:fillRef idx="1003">
+            <a:schemeClr val="lt1"/>
+          </a:fillRef>
+          <a:effectRef idx="1">
+            <a:schemeClr val="accent3"/>
+          </a:effectRef>
+          <a:fontRef idx="minor">
+            <a:schemeClr val="dk1"/>
+          </a:fontRef>
+        </p:style>
+        <p:txBody>
+          <a:bodyPr rtlCol="0" anchor="ctr"/>
+          <a:lstStyle/>
+          <a:p>
+            <a:pPr algn="ctr"/>
+            <a:r>
+              <a:rPr lang="en-US" sz="1400" dirty="0" smtClean="0">
+                <a:latin typeface="Consolas" panose="020B0609020204030204" pitchFamily="49" charset="0"/>
+                <a:cs typeface="Consolas" panose="020B0609020204030204" pitchFamily="49" charset="0"/>
+              </a:rPr>
+              <a:t>&lt;speaker-compose&gt;</a:t>
+            </a:r>
+          </a:p>
+        </p:txBody>
+      </p:sp>
+      <p:sp>
+        <p:nvSpPr>
+          <p:cNvPr id="8" name="Rounded Rectangle 7"/>
+          <p:cNvSpPr/>
+          <p:nvPr/>
+        </p:nvSpPr>
+        <p:spPr>
+          <a:xfrm>
+            <a:off x="4691269" y="2474180"/>
+            <a:ext cx="2520565" cy="565582"/>
+          </a:xfrm>
+          <a:prstGeom prst="roundRect">
+            <a:avLst/>
+          </a:prstGeom>
+        </p:spPr>
+        <p:style>
+          <a:lnRef idx="1">
+            <a:schemeClr val="accent3"/>
+          </a:lnRef>
+          <a:fillRef idx="1003">
+            <a:schemeClr val="lt1"/>
+          </a:fillRef>
+          <a:effectRef idx="1">
+            <a:schemeClr val="accent3"/>
+          </a:effectRef>
+          <a:fontRef idx="minor">
+            <a:schemeClr val="dk1"/>
+          </a:fontRef>
+        </p:style>
+        <p:txBody>
+          <a:bodyPr rtlCol="0" anchor="ctr"/>
+          <a:lstStyle/>
+          <a:p>
+            <a:pPr algn="ctr"/>
+            <a:r>
+              <a:rPr lang="en-US" sz="1400" dirty="0" smtClean="0">
+                <a:latin typeface="Consolas" panose="020B0609020204030204" pitchFamily="49" charset="0"/>
+                <a:cs typeface="Consolas" panose="020B0609020204030204" pitchFamily="49" charset="0"/>
+              </a:rPr>
+              <a:t>&lt;speaker-post-set&gt;</a:t>
+            </a:r>
+            <a:br>
+              <a:rPr lang="en-US" sz="1400" dirty="0" smtClean="0">
+                <a:latin typeface="Consolas" panose="020B0609020204030204" pitchFamily="49" charset="0"/>
+                <a:cs typeface="Consolas" panose="020B0609020204030204" pitchFamily="49" charset="0"/>
+              </a:rPr>
+            </a:br>
+            <a:r>
+              <a:rPr lang="en-US" sz="1400" i="1" dirty="0" smtClean="0">
+                <a:cs typeface="Consolas" panose="020B0609020204030204" pitchFamily="49" charset="0"/>
+              </a:rPr>
+              <a:t>(top level reply set)</a:t>
+            </a:r>
+          </a:p>
+        </p:txBody>
+      </p:sp>
+      <p:sp>
+        <p:nvSpPr>
+          <p:cNvPr id="9" name="Rounded Rectangle 8"/>
+          <p:cNvSpPr/>
+          <p:nvPr/>
+        </p:nvSpPr>
+        <p:spPr>
+          <a:xfrm>
+            <a:off x="7824081" y="2474179"/>
+            <a:ext cx="2520565" cy="626830"/>
+          </a:xfrm>
+          <a:prstGeom prst="roundRect">
+            <a:avLst/>
+          </a:prstGeom>
+        </p:spPr>
+        <p:style>
+          <a:lnRef idx="1">
+            <a:schemeClr val="accent6"/>
+          </a:lnRef>
+          <a:fillRef idx="2">
+            <a:schemeClr val="accent6"/>
+          </a:fillRef>
+          <a:effectRef idx="1">
+            <a:schemeClr val="accent6"/>
+          </a:effectRef>
+          <a:fontRef idx="minor">
+            <a:schemeClr val="dk1"/>
+          </a:fontRef>
+        </p:style>
+        <p:txBody>
+          <a:bodyPr rtlCol="0" anchor="ctr"/>
+          <a:lstStyle/>
+          <a:p>
+            <a:pPr algn="ctr"/>
+            <a:r>
+              <a:rPr lang="en-US" sz="1400" dirty="0" smtClean="0">
+                <a:latin typeface="Consolas" panose="020B0609020204030204" pitchFamily="49" charset="0"/>
+                <a:cs typeface="Consolas" panose="020B0609020204030204" pitchFamily="49" charset="0"/>
+              </a:rPr>
+              <a:t>&lt;header </a:t>
+            </a:r>
+            <a:br>
+              <a:rPr lang="en-US" sz="1400" dirty="0" smtClean="0">
+                <a:latin typeface="Consolas" panose="020B0609020204030204" pitchFamily="49" charset="0"/>
+                <a:cs typeface="Consolas" panose="020B0609020204030204" pitchFamily="49" charset="0"/>
+              </a:rPr>
+            </a:br>
+            <a:r>
+              <a:rPr lang="en-US" sz="1400" dirty="0" smtClean="0">
+                <a:latin typeface="Consolas" panose="020B0609020204030204" pitchFamily="49" charset="0"/>
+                <a:cs typeface="Consolas" panose="020B0609020204030204" pitchFamily="49" charset="0"/>
+              </a:rPr>
+              <a:t>class=</a:t>
+            </a:r>
+            <a:r>
+              <a:rPr lang="en-US" sz="1400" dirty="0">
+                <a:latin typeface="Consolas" panose="020B0609020204030204" pitchFamily="49" charset="0"/>
+                <a:cs typeface="Consolas" panose="020B0609020204030204" pitchFamily="49" charset="0"/>
+              </a:rPr>
+              <a:t>"</a:t>
+            </a:r>
+            <a:r>
+              <a:rPr lang="en-US" sz="1400" dirty="0" smtClean="0">
+                <a:latin typeface="Consolas" panose="020B0609020204030204" pitchFamily="49" charset="0"/>
+                <a:cs typeface="Consolas" panose="020B0609020204030204" pitchFamily="49" charset="0"/>
+              </a:rPr>
+              <a:t>thread-header</a:t>
+            </a:r>
+            <a:r>
+              <a:rPr lang="en-US" sz="1400" dirty="0">
+                <a:latin typeface="Consolas" panose="020B0609020204030204" pitchFamily="49" charset="0"/>
+                <a:cs typeface="Consolas" panose="020B0609020204030204" pitchFamily="49" charset="0"/>
+              </a:rPr>
+              <a:t>"</a:t>
+            </a:r>
+            <a:r>
+              <a:rPr lang="en-US" sz="1400" dirty="0" smtClean="0">
+                <a:latin typeface="Consolas" panose="020B0609020204030204" pitchFamily="49" charset="0"/>
+                <a:cs typeface="Consolas" panose="020B0609020204030204" pitchFamily="49" charset="0"/>
+              </a:rPr>
+              <a:t>&gt;</a:t>
+            </a:r>
+          </a:p>
+        </p:txBody>
+      </p:sp>
+      <p:sp>
+        <p:nvSpPr>
+          <p:cNvPr id="10" name="Rounded Rectangle 9"/>
+          <p:cNvSpPr/>
+          <p:nvPr/>
+        </p:nvSpPr>
+        <p:spPr>
+          <a:xfrm>
+            <a:off x="1549178" y="3374002"/>
+            <a:ext cx="2520565" cy="379014"/>
+          </a:xfrm>
+          <a:prstGeom prst="roundRect">
+            <a:avLst/>
+          </a:prstGeom>
+        </p:spPr>
+        <p:style>
+          <a:lnRef idx="1">
+            <a:schemeClr val="accent6"/>
+          </a:lnRef>
+          <a:fillRef idx="2">
+            <a:schemeClr val="accent6"/>
+          </a:fillRef>
+          <a:effectRef idx="1">
+            <a:schemeClr val="accent6"/>
+          </a:effectRef>
+          <a:fontRef idx="minor">
+            <a:schemeClr val="dk1"/>
+          </a:fontRef>
+        </p:style>
+        <p:txBody>
+          <a:bodyPr rtlCol="0" anchor="ctr"/>
+          <a:lstStyle/>
+          <a:p>
+            <a:pPr algn="ctr"/>
+            <a:r>
+              <a:rPr lang="en-US" sz="1400" dirty="0" smtClean="0">
+                <a:latin typeface="Consolas" panose="020B0609020204030204" pitchFamily="49" charset="0"/>
+                <a:cs typeface="Consolas" panose="020B0609020204030204" pitchFamily="49" charset="0"/>
+              </a:rPr>
+              <a:t>&lt;textarea&gt;</a:t>
+            </a:r>
+          </a:p>
+        </p:txBody>
+      </p:sp>
+      <p:sp>
+        <p:nvSpPr>
+          <p:cNvPr id="11" name="Rounded Rectangle 10"/>
+          <p:cNvSpPr/>
+          <p:nvPr/>
+        </p:nvSpPr>
+        <p:spPr>
+          <a:xfrm>
+            <a:off x="2983064" y="4093558"/>
+            <a:ext cx="2520565" cy="665260"/>
+          </a:xfrm>
+          <a:prstGeom prst="roundRect">
+            <a:avLst/>
+          </a:prstGeom>
+        </p:spPr>
+        <p:style>
+          <a:lnRef idx="1">
+            <a:schemeClr val="accent3"/>
+          </a:lnRef>
+          <a:fillRef idx="1003">
+            <a:schemeClr val="lt1"/>
+          </a:fillRef>
+          <a:effectRef idx="1">
+            <a:schemeClr val="accent3"/>
+          </a:effectRef>
+          <a:fontRef idx="minor">
+            <a:schemeClr val="dk1"/>
+          </a:fontRef>
+        </p:style>
+        <p:txBody>
+          <a:bodyPr rtlCol="0" anchor="ctr"/>
+          <a:lstStyle/>
+          <a:p>
+            <a:pPr algn="ctr"/>
+            <a:r>
+              <a:rPr lang="en-US" sz="1400" dirty="0" smtClean="0">
+                <a:latin typeface="Consolas" panose="020B0609020204030204" pitchFamily="49" charset="0"/>
+                <a:cs typeface="Consolas" panose="020B0609020204030204" pitchFamily="49" charset="0"/>
+              </a:rPr>
+              <a:t>&lt;speaker-post </a:t>
+            </a:r>
+          </a:p>
+          <a:p>
+            <a:pPr algn="ctr"/>
+            <a:r>
+              <a:rPr lang="en-US" sz="1400" dirty="0" smtClean="0">
+                <a:latin typeface="Consolas" panose="020B0609020204030204" pitchFamily="49" charset="0"/>
+                <a:cs typeface="Consolas" panose="020B0609020204030204" pitchFamily="49" charset="0"/>
+              </a:rPr>
+              <a:t>id=</a:t>
+            </a:r>
+            <a:r>
+              <a:rPr lang="en-US" sz="1400" dirty="0">
+                <a:latin typeface="Consolas" panose="020B0609020204030204" pitchFamily="49" charset="0"/>
+                <a:cs typeface="Consolas" panose="020B0609020204030204" pitchFamily="49" charset="0"/>
+              </a:rPr>
+              <a:t>"</a:t>
+            </a:r>
+            <a:r>
+              <a:rPr lang="en-US" sz="1400" dirty="0" smtClean="0">
+                <a:latin typeface="Consolas" panose="020B0609020204030204" pitchFamily="49" charset="0"/>
+                <a:cs typeface="Consolas" panose="020B0609020204030204" pitchFamily="49" charset="0"/>
+              </a:rPr>
+              <a:t>post-1</a:t>
+            </a:r>
+            <a:r>
+              <a:rPr lang="en-US" sz="1400" dirty="0">
+                <a:latin typeface="Consolas" panose="020B0609020204030204" pitchFamily="49" charset="0"/>
+                <a:cs typeface="Consolas" panose="020B0609020204030204" pitchFamily="49" charset="0"/>
+              </a:rPr>
+              <a:t>"</a:t>
+            </a:r>
+            <a:r>
+              <a:rPr lang="en-US" sz="1400" dirty="0" smtClean="0">
+                <a:latin typeface="Consolas" panose="020B0609020204030204" pitchFamily="49" charset="0"/>
+                <a:cs typeface="Consolas" panose="020B0609020204030204" pitchFamily="49" charset="0"/>
+              </a:rPr>
+              <a:t>&gt;</a:t>
+            </a:r>
+          </a:p>
+        </p:txBody>
+      </p:sp>
+      <p:sp>
+        <p:nvSpPr>
+          <p:cNvPr id="12" name="Rounded Rectangle 11"/>
+          <p:cNvSpPr/>
+          <p:nvPr/>
+        </p:nvSpPr>
+        <p:spPr>
+          <a:xfrm>
+            <a:off x="6272248" y="4093558"/>
+            <a:ext cx="2520565" cy="665260"/>
+          </a:xfrm>
+          <a:prstGeom prst="roundRect">
+            <a:avLst/>
+          </a:prstGeom>
+        </p:spPr>
+        <p:style>
+          <a:lnRef idx="1">
+            <a:schemeClr val="accent3"/>
+          </a:lnRef>
+          <a:fillRef idx="1003">
+            <a:schemeClr val="lt1"/>
+          </a:fillRef>
+          <a:effectRef idx="1">
+            <a:schemeClr val="accent3"/>
+          </a:effectRef>
+          <a:fontRef idx="minor">
+            <a:schemeClr val="dk1"/>
+          </a:fontRef>
+        </p:style>
+        <p:txBody>
+          <a:bodyPr rtlCol="0" anchor="ctr"/>
+          <a:lstStyle/>
+          <a:p>
+            <a:pPr algn="ctr"/>
+            <a:r>
+              <a:rPr lang="en-US" sz="1400" dirty="0" smtClean="0">
+                <a:latin typeface="Consolas" panose="020B0609020204030204" pitchFamily="49" charset="0"/>
+                <a:cs typeface="Consolas" panose="020B0609020204030204" pitchFamily="49" charset="0"/>
+              </a:rPr>
+              <a:t>&lt;speaker-post </a:t>
+            </a:r>
+          </a:p>
+          <a:p>
+            <a:pPr algn="ctr"/>
+            <a:r>
+              <a:rPr lang="en-US" sz="1400" dirty="0">
+                <a:latin typeface="Consolas" panose="020B0609020204030204" pitchFamily="49" charset="0"/>
+                <a:cs typeface="Consolas" panose="020B0609020204030204" pitchFamily="49" charset="0"/>
+              </a:rPr>
+              <a:t>id="</a:t>
+            </a:r>
+            <a:r>
+              <a:rPr lang="en-US" sz="1400" dirty="0" smtClean="0">
+                <a:latin typeface="Consolas" panose="020B0609020204030204" pitchFamily="49" charset="0"/>
+                <a:cs typeface="Consolas" panose="020B0609020204030204" pitchFamily="49" charset="0"/>
+              </a:rPr>
+              <a:t>post-2</a:t>
+            </a:r>
+            <a:r>
+              <a:rPr lang="en-US" sz="1400" dirty="0">
+                <a:latin typeface="Consolas" panose="020B0609020204030204" pitchFamily="49" charset="0"/>
+                <a:cs typeface="Consolas" panose="020B0609020204030204" pitchFamily="49" charset="0"/>
+              </a:rPr>
+              <a:t>"</a:t>
+            </a:r>
+            <a:r>
+              <a:rPr lang="en-US" sz="1400" dirty="0" smtClean="0">
+                <a:latin typeface="Consolas" panose="020B0609020204030204" pitchFamily="49" charset="0"/>
+                <a:cs typeface="Consolas" panose="020B0609020204030204" pitchFamily="49" charset="0"/>
+              </a:rPr>
+              <a:t>&gt;</a:t>
+            </a:r>
+          </a:p>
+        </p:txBody>
+      </p:sp>
+      <p:sp>
+        <p:nvSpPr>
+          <p:cNvPr id="13" name="Rounded Rectangle 12"/>
+          <p:cNvSpPr/>
+          <p:nvPr/>
+        </p:nvSpPr>
+        <p:spPr>
+          <a:xfrm>
+            <a:off x="6272247" y="5246499"/>
+            <a:ext cx="2520565" cy="689112"/>
+          </a:xfrm>
+          <a:prstGeom prst="roundRect">
+            <a:avLst/>
+          </a:prstGeom>
+        </p:spPr>
+        <p:style>
+          <a:lnRef idx="1">
+            <a:schemeClr val="accent3"/>
+          </a:lnRef>
+          <a:fillRef idx="1003">
+            <a:schemeClr val="lt1"/>
+          </a:fillRef>
+          <a:effectRef idx="1">
+            <a:schemeClr val="accent3"/>
+          </a:effectRef>
+          <a:fontRef idx="minor">
+            <a:schemeClr val="dk1"/>
+          </a:fontRef>
+        </p:style>
+        <p:txBody>
+          <a:bodyPr rtlCol="0" anchor="ctr"/>
+          <a:lstStyle/>
+          <a:p>
+            <a:pPr algn="ctr"/>
+            <a:r>
+              <a:rPr lang="en-US" sz="1400" dirty="0" smtClean="0">
+                <a:latin typeface="Consolas" panose="020B0609020204030204" pitchFamily="49" charset="0"/>
+                <a:cs typeface="Consolas" panose="020B0609020204030204" pitchFamily="49" charset="0"/>
+              </a:rPr>
+              <a:t>&lt;speaker-post-set&gt;</a:t>
+            </a:r>
+            <a:br>
+              <a:rPr lang="en-US" sz="1400" dirty="0" smtClean="0">
+                <a:latin typeface="Consolas" panose="020B0609020204030204" pitchFamily="49" charset="0"/>
+                <a:cs typeface="Consolas" panose="020B0609020204030204" pitchFamily="49" charset="0"/>
+              </a:rPr>
+            </a:br>
+            <a:r>
+              <a:rPr lang="en-US" sz="1400" i="1" dirty="0" smtClean="0">
+                <a:cs typeface="Consolas" panose="020B0609020204030204" pitchFamily="49" charset="0"/>
+              </a:rPr>
+              <a:t>(replies)</a:t>
+            </a:r>
+          </a:p>
+        </p:txBody>
+      </p:sp>
+      <p:sp>
+        <p:nvSpPr>
+          <p:cNvPr id="14" name="TextBox 13"/>
+          <p:cNvSpPr txBox="1"/>
+          <p:nvPr/>
+        </p:nvSpPr>
+        <p:spPr>
+          <a:xfrm>
+            <a:off x="6957391" y="5812614"/>
+            <a:ext cx="1653871" cy="830997"/>
+          </a:xfrm>
+          <a:prstGeom prst="rect">
+            <a:avLst/>
+          </a:prstGeom>
+          <a:noFill/>
+        </p:spPr>
+        <p:txBody>
+          <a:bodyPr wrap="square" rtlCol="0">
+            <a:spAutoFit/>
+          </a:bodyPr>
+          <a:lstStyle/>
+          <a:p>
+            <a:r>
+              <a:rPr lang="en-US" sz="4800" dirty="0" smtClean="0">
+                <a:latin typeface="Consolas" panose="020B0609020204030204" pitchFamily="49" charset="0"/>
+                <a:cs typeface="Consolas" panose="020B0609020204030204" pitchFamily="49" charset="0"/>
+              </a:rPr>
+              <a:t>...</a:t>
+            </a:r>
+            <a:endParaRPr lang="en-US" sz="4800" dirty="0">
+              <a:latin typeface="Consolas" panose="020B0609020204030204" pitchFamily="49" charset="0"/>
+              <a:cs typeface="Consolas" panose="020B0609020204030204" pitchFamily="49" charset="0"/>
+            </a:endParaRPr>
+          </a:p>
+        </p:txBody>
+      </p:sp>
+      <p:cxnSp>
+        <p:nvCxnSpPr>
+          <p:cNvPr id="17" name="Straight Connector 16"/>
+          <p:cNvCxnSpPr>
+            <a:stCxn id="2" idx="2"/>
+            <a:endCxn id="5" idx="0"/>
+          </p:cNvCxnSpPr>
+          <p:nvPr/>
+        </p:nvCxnSpPr>
+        <p:spPr>
+          <a:xfrm>
+            <a:off x="5824330" y="707666"/>
+            <a:ext cx="0" cy="422741"/>
+          </a:xfrm>
+          <a:prstGeom prst="line">
+            <a:avLst/>
+          </a:prstGeom>
+          <a:ln w="28575"/>
+        </p:spPr>
+        <p:style>
+          <a:lnRef idx="1">
+            <a:schemeClr val="dk1"/>
+          </a:lnRef>
+          <a:fillRef idx="0">
+            <a:schemeClr val="dk1"/>
+          </a:fillRef>
+          <a:effectRef idx="0">
+            <a:schemeClr val="dk1"/>
+          </a:effectRef>
+          <a:fontRef idx="minor">
+            <a:schemeClr val="tx1"/>
+          </a:fontRef>
+        </p:style>
+      </p:cxnSp>
+      <p:grpSp>
+        <p:nvGrpSpPr>
+          <p:cNvPr id="62" name="Group 61"/>
+          <p:cNvGrpSpPr/>
+          <p:nvPr/>
+        </p:nvGrpSpPr>
+        <p:grpSpPr>
+          <a:xfrm>
+            <a:off x="2809461" y="707666"/>
+            <a:ext cx="6239838" cy="5498701"/>
+            <a:chOff x="2809461" y="707666"/>
+            <a:chExt cx="6239838" cy="5498701"/>
+          </a:xfrm>
+        </p:grpSpPr>
+        <p:grpSp>
+          <p:nvGrpSpPr>
+            <p:cNvPr id="61" name="Group 60"/>
+            <p:cNvGrpSpPr/>
+            <p:nvPr/>
+          </p:nvGrpSpPr>
+          <p:grpSpPr>
+            <a:xfrm>
+              <a:off x="2809461" y="707666"/>
+              <a:ext cx="6239838" cy="3385892"/>
+              <a:chOff x="2809461" y="707666"/>
+              <a:chExt cx="6239838" cy="3385892"/>
+            </a:xfrm>
+          </p:grpSpPr>
+          <p:cxnSp>
+            <p:nvCxnSpPr>
+              <p:cNvPr id="16" name="Straight Connector 15"/>
+              <p:cNvCxnSpPr>
+                <a:stCxn id="2" idx="2"/>
+              </p:cNvCxnSpPr>
+              <p:nvPr/>
+            </p:nvCxnSpPr>
+            <p:spPr>
+              <a:xfrm flipH="1">
+                <a:off x="3558747" y="707666"/>
+                <a:ext cx="2265583" cy="422740"/>
+              </a:xfrm>
+              <a:prstGeom prst="line">
+                <a:avLst/>
+              </a:prstGeom>
+              <a:ln w="28575">
+                <a:solidFill>
+                  <a:schemeClr val="bg2">
+                    <a:lumMod val="50000"/>
+                  </a:schemeClr>
+                </a:solidFill>
+              </a:ln>
+            </p:spPr>
+            <p:style>
+              <a:lnRef idx="1">
+                <a:schemeClr val="dk1"/>
+              </a:lnRef>
+              <a:fillRef idx="0">
+                <a:schemeClr val="dk1"/>
+              </a:fillRef>
+              <a:effectRef idx="0">
+                <a:schemeClr val="dk1"/>
+              </a:effectRef>
+              <a:fontRef idx="minor">
+                <a:schemeClr val="tx1"/>
+              </a:fontRef>
+            </p:style>
+          </p:cxnSp>
+          <p:cxnSp>
+            <p:nvCxnSpPr>
+              <p:cNvPr id="20" name="Straight Connector 19"/>
+              <p:cNvCxnSpPr>
+                <a:stCxn id="2" idx="2"/>
+                <a:endCxn id="6" idx="0"/>
+              </p:cNvCxnSpPr>
+              <p:nvPr/>
+            </p:nvCxnSpPr>
+            <p:spPr>
+              <a:xfrm>
+                <a:off x="5824330" y="707666"/>
+                <a:ext cx="3014869" cy="422741"/>
+              </a:xfrm>
+              <a:prstGeom prst="line">
+                <a:avLst/>
+              </a:prstGeom>
+              <a:ln w="28575">
+                <a:solidFill>
+                  <a:schemeClr val="bg2">
+                    <a:lumMod val="50000"/>
+                  </a:schemeClr>
+                </a:solidFill>
+              </a:ln>
+            </p:spPr>
+            <p:style>
+              <a:lnRef idx="1">
+                <a:schemeClr val="dk1"/>
+              </a:lnRef>
+              <a:fillRef idx="0">
+                <a:schemeClr val="dk1"/>
+              </a:fillRef>
+              <a:effectRef idx="0">
+                <a:schemeClr val="dk1"/>
+              </a:effectRef>
+              <a:fontRef idx="minor">
+                <a:schemeClr val="tx1"/>
+              </a:fontRef>
+            </p:style>
+          </p:cxnSp>
+          <p:cxnSp>
+            <p:nvCxnSpPr>
+              <p:cNvPr id="25" name="Straight Connector 24"/>
+              <p:cNvCxnSpPr>
+                <a:stCxn id="5" idx="2"/>
+                <a:endCxn id="7" idx="0"/>
+              </p:cNvCxnSpPr>
+              <p:nvPr/>
+            </p:nvCxnSpPr>
+            <p:spPr>
+              <a:xfrm flipH="1">
+                <a:off x="2898250" y="1512070"/>
+                <a:ext cx="2926080" cy="962110"/>
+              </a:xfrm>
+              <a:prstGeom prst="line">
+                <a:avLst/>
+              </a:prstGeom>
+              <a:ln w="28575">
+                <a:solidFill>
+                  <a:schemeClr val="bg2">
+                    <a:lumMod val="50000"/>
+                  </a:schemeClr>
+                </a:solidFill>
+              </a:ln>
+            </p:spPr>
+            <p:style>
+              <a:lnRef idx="1">
+                <a:schemeClr val="dk1"/>
+              </a:lnRef>
+              <a:fillRef idx="0">
+                <a:schemeClr val="dk1"/>
+              </a:fillRef>
+              <a:effectRef idx="0">
+                <a:schemeClr val="dk1"/>
+              </a:effectRef>
+              <a:fontRef idx="minor">
+                <a:schemeClr val="tx1"/>
+              </a:fontRef>
+            </p:style>
+          </p:cxnSp>
+          <p:cxnSp>
+            <p:nvCxnSpPr>
+              <p:cNvPr id="28" name="Straight Connector 27"/>
+              <p:cNvCxnSpPr>
+                <a:stCxn id="5" idx="2"/>
+                <a:endCxn id="8" idx="0"/>
+              </p:cNvCxnSpPr>
+              <p:nvPr/>
+            </p:nvCxnSpPr>
+            <p:spPr>
+              <a:xfrm>
+                <a:off x="5824330" y="1512070"/>
+                <a:ext cx="127222" cy="962110"/>
+              </a:xfrm>
+              <a:prstGeom prst="line">
+                <a:avLst/>
+              </a:prstGeom>
+              <a:ln w="28575">
+                <a:solidFill>
+                  <a:schemeClr val="bg2">
+                    <a:lumMod val="50000"/>
+                  </a:schemeClr>
+                </a:solidFill>
+              </a:ln>
+            </p:spPr>
+            <p:style>
+              <a:lnRef idx="1">
+                <a:schemeClr val="dk1"/>
+              </a:lnRef>
+              <a:fillRef idx="0">
+                <a:schemeClr val="dk1"/>
+              </a:fillRef>
+              <a:effectRef idx="0">
+                <a:schemeClr val="dk1"/>
+              </a:effectRef>
+              <a:fontRef idx="minor">
+                <a:schemeClr val="tx1"/>
+              </a:fontRef>
+            </p:style>
+          </p:cxnSp>
+          <p:cxnSp>
+            <p:nvCxnSpPr>
+              <p:cNvPr id="31" name="Straight Connector 30"/>
+              <p:cNvCxnSpPr>
+                <a:stCxn id="5" idx="2"/>
+              </p:cNvCxnSpPr>
+              <p:nvPr/>
+            </p:nvCxnSpPr>
+            <p:spPr>
+              <a:xfrm>
+                <a:off x="5824330" y="1512070"/>
+                <a:ext cx="3224969" cy="941570"/>
+              </a:xfrm>
+              <a:prstGeom prst="line">
+                <a:avLst/>
+              </a:prstGeom>
+              <a:ln w="28575">
+                <a:solidFill>
+                  <a:schemeClr val="bg2">
+                    <a:lumMod val="50000"/>
+                  </a:schemeClr>
+                </a:solidFill>
+              </a:ln>
+            </p:spPr>
+            <p:style>
+              <a:lnRef idx="1">
+                <a:schemeClr val="dk1"/>
+              </a:lnRef>
+              <a:fillRef idx="0">
+                <a:schemeClr val="dk1"/>
+              </a:fillRef>
+              <a:effectRef idx="0">
+                <a:schemeClr val="dk1"/>
+              </a:effectRef>
+              <a:fontRef idx="minor">
+                <a:schemeClr val="tx1"/>
+              </a:fontRef>
+            </p:style>
+          </p:cxnSp>
+          <p:cxnSp>
+            <p:nvCxnSpPr>
+              <p:cNvPr id="40" name="Straight Connector 39"/>
+              <p:cNvCxnSpPr>
+                <a:stCxn id="7" idx="2"/>
+                <a:endCxn id="10" idx="0"/>
+              </p:cNvCxnSpPr>
+              <p:nvPr/>
+            </p:nvCxnSpPr>
+            <p:spPr>
+              <a:xfrm flipH="1">
+                <a:off x="2809461" y="2855843"/>
+                <a:ext cx="88789" cy="518159"/>
+              </a:xfrm>
+              <a:prstGeom prst="line">
+                <a:avLst/>
+              </a:prstGeom>
+              <a:ln w="28575">
+                <a:solidFill>
+                  <a:schemeClr val="bg2">
+                    <a:lumMod val="50000"/>
+                  </a:schemeClr>
+                </a:solidFill>
+              </a:ln>
+            </p:spPr>
+            <p:style>
+              <a:lnRef idx="1">
+                <a:schemeClr val="dk1"/>
+              </a:lnRef>
+              <a:fillRef idx="0">
+                <a:schemeClr val="dk1"/>
+              </a:fillRef>
+              <a:effectRef idx="0">
+                <a:schemeClr val="dk1"/>
+              </a:effectRef>
+              <a:fontRef idx="minor">
+                <a:schemeClr val="tx1"/>
+              </a:fontRef>
+            </p:style>
+          </p:cxnSp>
+          <p:cxnSp>
+            <p:nvCxnSpPr>
+              <p:cNvPr id="43" name="Straight Connector 42"/>
+              <p:cNvCxnSpPr>
+                <a:stCxn id="8" idx="2"/>
+                <a:endCxn id="11" idx="0"/>
+              </p:cNvCxnSpPr>
+              <p:nvPr/>
+            </p:nvCxnSpPr>
+            <p:spPr>
+              <a:xfrm flipH="1">
+                <a:off x="4243347" y="3039762"/>
+                <a:ext cx="1708205" cy="1053796"/>
+              </a:xfrm>
+              <a:prstGeom prst="line">
+                <a:avLst/>
+              </a:prstGeom>
+              <a:ln w="28575">
+                <a:solidFill>
+                  <a:schemeClr val="bg2">
+                    <a:lumMod val="50000"/>
+                  </a:schemeClr>
+                </a:solidFill>
+              </a:ln>
+            </p:spPr>
+            <p:style>
+              <a:lnRef idx="1">
+                <a:schemeClr val="dk1"/>
+              </a:lnRef>
+              <a:fillRef idx="0">
+                <a:schemeClr val="dk1"/>
+              </a:fillRef>
+              <a:effectRef idx="0">
+                <a:schemeClr val="dk1"/>
+              </a:effectRef>
+              <a:fontRef idx="minor">
+                <a:schemeClr val="tx1"/>
+              </a:fontRef>
+            </p:style>
+          </p:cxnSp>
+          <p:cxnSp>
+            <p:nvCxnSpPr>
+              <p:cNvPr id="46" name="Straight Connector 45"/>
+              <p:cNvCxnSpPr>
+                <a:stCxn id="8" idx="2"/>
+                <a:endCxn id="12" idx="0"/>
+              </p:cNvCxnSpPr>
+              <p:nvPr/>
+            </p:nvCxnSpPr>
+            <p:spPr>
+              <a:xfrm>
+                <a:off x="5951552" y="3039762"/>
+                <a:ext cx="1580979" cy="1053796"/>
+              </a:xfrm>
+              <a:prstGeom prst="line">
+                <a:avLst/>
+              </a:prstGeom>
+              <a:ln w="28575">
+                <a:solidFill>
+                  <a:schemeClr val="bg2">
+                    <a:lumMod val="50000"/>
+                  </a:schemeClr>
+                </a:solidFill>
+              </a:ln>
+            </p:spPr>
+            <p:style>
+              <a:lnRef idx="1">
+                <a:schemeClr val="dk1"/>
+              </a:lnRef>
+              <a:fillRef idx="0">
+                <a:schemeClr val="dk1"/>
+              </a:fillRef>
+              <a:effectRef idx="0">
+                <a:schemeClr val="dk1"/>
+              </a:effectRef>
+              <a:fontRef idx="minor">
+                <a:schemeClr val="tx1"/>
+              </a:fontRef>
+            </p:style>
+          </p:cxnSp>
+        </p:grpSp>
+        <p:cxnSp>
+          <p:nvCxnSpPr>
+            <p:cNvPr id="51" name="Straight Connector 50"/>
+            <p:cNvCxnSpPr>
+              <a:stCxn id="13" idx="0"/>
+              <a:endCxn id="12" idx="2"/>
+            </p:cNvCxnSpPr>
+            <p:nvPr/>
+          </p:nvCxnSpPr>
+          <p:spPr>
+            <a:xfrm flipV="1">
+              <a:off x="7532530" y="4758818"/>
+              <a:ext cx="1" cy="487681"/>
+            </a:xfrm>
+            <a:prstGeom prst="line">
+              <a:avLst/>
+            </a:prstGeom>
+            <a:ln w="28575">
+              <a:solidFill>
+                <a:schemeClr val="bg2">
+                  <a:lumMod val="50000"/>
+                </a:schemeClr>
+              </a:solidFill>
+            </a:ln>
+          </p:spPr>
+          <p:style>
+            <a:lnRef idx="1">
+              <a:schemeClr val="dk1"/>
+            </a:lnRef>
+            <a:fillRef idx="0">
+              <a:schemeClr val="dk1"/>
+            </a:fillRef>
+            <a:effectRef idx="0">
+              <a:schemeClr val="dk1"/>
+            </a:effectRef>
+            <a:fontRef idx="minor">
+              <a:schemeClr val="tx1"/>
+            </a:fontRef>
+          </p:style>
+        </p:cxnSp>
+        <p:cxnSp>
+          <p:nvCxnSpPr>
+            <p:cNvPr id="54" name="Straight Connector 53"/>
+            <p:cNvCxnSpPr/>
+            <p:nvPr/>
+          </p:nvCxnSpPr>
+          <p:spPr>
+            <a:xfrm flipV="1">
+              <a:off x="7531556" y="5935611"/>
+              <a:ext cx="973" cy="270756"/>
+            </a:xfrm>
+            <a:prstGeom prst="line">
+              <a:avLst/>
+            </a:prstGeom>
+            <a:ln w="28575">
+              <a:solidFill>
+                <a:schemeClr val="bg2">
+                  <a:lumMod val="50000"/>
+                </a:schemeClr>
+              </a:solidFill>
+            </a:ln>
+          </p:spPr>
+          <p:style>
+            <a:lnRef idx="1">
+              <a:schemeClr val="dk1"/>
+            </a:lnRef>
+            <a:fillRef idx="0">
+              <a:schemeClr val="dk1"/>
+            </a:fillRef>
+            <a:effectRef idx="0">
+              <a:schemeClr val="dk1"/>
+            </a:effectRef>
+            <a:fontRef idx="minor">
+              <a:schemeClr val="tx1"/>
+            </a:fontRef>
+          </p:style>
+        </p:cxnSp>
+      </p:grpSp>
+      <p:grpSp>
+        <p:nvGrpSpPr>
+          <p:cNvPr id="64" name="Group 63"/>
+          <p:cNvGrpSpPr/>
+          <p:nvPr/>
+        </p:nvGrpSpPr>
+        <p:grpSpPr>
+          <a:xfrm>
+            <a:off x="1458351" y="5011114"/>
+            <a:ext cx="2784390" cy="1474573"/>
+            <a:chOff x="1285353" y="5060542"/>
+            <a:chExt cx="2784390" cy="1474573"/>
+          </a:xfrm>
+        </p:grpSpPr>
+        <p:sp>
+          <p:nvSpPr>
+            <p:cNvPr id="60" name="Rectangle 59"/>
+            <p:cNvSpPr/>
+            <p:nvPr/>
+          </p:nvSpPr>
+          <p:spPr>
+            <a:xfrm>
+              <a:off x="1285353" y="5060542"/>
+              <a:ext cx="2784390" cy="1474573"/>
+            </a:xfrm>
+            <a:prstGeom prst="rect">
+              <a:avLst/>
+            </a:prstGeom>
+            <a:noFill/>
+          </p:spPr>
+          <p:style>
+            <a:lnRef idx="2">
+              <a:schemeClr val="accent1">
+                <a:shade val="50000"/>
+              </a:schemeClr>
+            </a:lnRef>
+            <a:fillRef idx="1">
+              <a:schemeClr val="accent1"/>
+            </a:fillRef>
+            <a:effectRef idx="0">
+              <a:schemeClr val="accent1"/>
+            </a:effectRef>
+            <a:fontRef idx="minor">
+              <a:schemeClr val="lt1"/>
+            </a:fontRef>
+          </p:style>
+          <p:txBody>
+            <a:bodyPr rtlCol="0" anchor="ctr"/>
+            <a:lstStyle/>
+            <a:p>
+              <a:pPr algn="ctr"/>
+              <a:endParaRPr lang="en-US" sz="1400">
+                <a:latin typeface="Consolas" panose="020B0609020204030204" pitchFamily="49" charset="0"/>
+                <a:cs typeface="Consolas" panose="020B0609020204030204" pitchFamily="49" charset="0"/>
+              </a:endParaRPr>
+            </a:p>
+          </p:txBody>
+        </p:sp>
+        <p:sp>
+          <p:nvSpPr>
+            <p:cNvPr id="56" name="Rounded Rectangle 55"/>
+            <p:cNvSpPr/>
+            <p:nvPr/>
+          </p:nvSpPr>
+          <p:spPr>
+            <a:xfrm>
+              <a:off x="1421743" y="5199584"/>
+              <a:ext cx="2520565" cy="379014"/>
+            </a:xfrm>
+            <a:prstGeom prst="roundRect">
+              <a:avLst/>
+            </a:prstGeom>
+          </p:spPr>
+          <p:style>
+            <a:lnRef idx="1">
+              <a:schemeClr val="accent6"/>
+            </a:lnRef>
+            <a:fillRef idx="2">
+              <a:schemeClr val="accent6"/>
+            </a:fillRef>
+            <a:effectRef idx="1">
+              <a:schemeClr val="accent6"/>
+            </a:effectRef>
+            <a:fontRef idx="minor">
+              <a:schemeClr val="dk1"/>
+            </a:fontRef>
+          </p:style>
+          <p:txBody>
+            <a:bodyPr rtlCol="0" anchor="ctr"/>
+            <a:lstStyle/>
+            <a:p>
+              <a:pPr algn="ctr"/>
+              <a:r>
+                <a:rPr lang="en-US" sz="1200" dirty="0" smtClean="0">
+                  <a:latin typeface="Consolas" panose="020B0609020204030204" pitchFamily="49" charset="0"/>
+                  <a:cs typeface="Consolas" panose="020B0609020204030204" pitchFamily="49" charset="0"/>
+                </a:rPr>
+                <a:t>standard HTML</a:t>
+              </a:r>
+            </a:p>
+          </p:txBody>
+        </p:sp>
+        <p:sp>
+          <p:nvSpPr>
+            <p:cNvPr id="58" name="Rounded Rectangle 57"/>
+            <p:cNvSpPr/>
+            <p:nvPr/>
+          </p:nvSpPr>
+          <p:spPr>
+            <a:xfrm>
+              <a:off x="1421743" y="5724601"/>
+              <a:ext cx="2520565" cy="381663"/>
+            </a:xfrm>
+            <a:prstGeom prst="roundRect">
+              <a:avLst/>
+            </a:prstGeom>
+          </p:spPr>
+          <p:style>
+            <a:lnRef idx="1">
+              <a:schemeClr val="accent3"/>
+            </a:lnRef>
+            <a:fillRef idx="1003">
+              <a:schemeClr val="lt1"/>
+            </a:fillRef>
+            <a:effectRef idx="1">
+              <a:schemeClr val="accent3"/>
+            </a:effectRef>
+            <a:fontRef idx="minor">
+              <a:schemeClr val="dk1"/>
+            </a:fontRef>
+          </p:style>
+          <p:txBody>
+            <a:bodyPr rtlCol="0" anchor="ctr"/>
+            <a:lstStyle/>
+            <a:p>
+              <a:pPr algn="ctr"/>
+              <a:r>
+                <a:rPr lang="en-US" sz="1200" dirty="0" smtClean="0">
+                  <a:latin typeface="Consolas" panose="020B0609020204030204" pitchFamily="49" charset="0"/>
+                  <a:cs typeface="Consolas" panose="020B0609020204030204" pitchFamily="49" charset="0"/>
+                </a:rPr>
+                <a:t>custom element</a:t>
+              </a:r>
+            </a:p>
+          </p:txBody>
+        </p:sp>
+        <p:sp>
+          <p:nvSpPr>
+            <p:cNvPr id="59" name="TextBox 58"/>
+            <p:cNvSpPr txBox="1"/>
+            <p:nvPr/>
+          </p:nvSpPr>
+          <p:spPr>
+            <a:xfrm>
+              <a:off x="2315802" y="6106264"/>
+              <a:ext cx="732447" cy="307777"/>
+            </a:xfrm>
+            <a:prstGeom prst="rect">
+              <a:avLst/>
+            </a:prstGeom>
+            <a:noFill/>
+          </p:spPr>
+          <p:txBody>
+            <a:bodyPr wrap="square" rtlCol="0">
+              <a:spAutoFit/>
+            </a:bodyPr>
+            <a:lstStyle/>
+            <a:p>
+              <a:r>
+                <a:rPr lang="en-US" sz="1400" dirty="0" smtClean="0">
+                  <a:cs typeface="Consolas" panose="020B0609020204030204" pitchFamily="49" charset="0"/>
+                </a:rPr>
+                <a:t>Legend</a:t>
+              </a:r>
+              <a:endParaRPr lang="en-US" sz="1400" dirty="0">
+                <a:cs typeface="Consolas" panose="020B0609020204030204" pitchFamily="49" charset="0"/>
+              </a:endParaRPr>
+            </a:p>
+          </p:txBody>
+        </p:sp>
+      </p:grpSp>
+    </p:spTree>
+    <p:extLst>
+      <p:ext uri="{BB962C8B-B14F-4D97-AF65-F5344CB8AC3E}">
+        <p14:creationId xmlns:p14="http://schemas.microsoft.com/office/powerpoint/2010/main" val="2611683633"/>
+      </p:ext>
+    </p:extLst>
+  </p:cSld>
+  <p:clrMapOvr>
+    <a:masterClrMapping/>
+  </p:clrMapOvr>
+</p:sld>
+</file>
+
 <file path=ppt/theme/theme1.xml><?xml version="1.0" encoding="utf-8"?>
 <a:theme xmlns:a="http://schemas.openxmlformats.org/drawingml/2006/main" name="Office Theme">
   <a:themeElements>

</xml_diff>

<commit_message>
Nearly done with Ch. 4.
</commit_message>
<xml_diff>
--- a/figures.pptx
+++ b/figures.pptx
@@ -3551,8 +3551,8 @@
         </p:nvSpPr>
         <p:spPr>
           <a:xfrm>
-            <a:off x="4691269" y="326003"/>
-            <a:ext cx="2266122" cy="381663"/>
+            <a:off x="4691269" y="293051"/>
+            <a:ext cx="2266122" cy="533648"/>
           </a:xfrm>
           <a:prstGeom prst="roundRect">
             <a:avLst/>
@@ -3582,8 +3582,36 @@
                 <a:latin typeface="Consolas" panose="020B0609020204030204" pitchFamily="49" charset="0"/>
                 <a:cs typeface="Consolas" panose="020B0609020204030204" pitchFamily="49" charset="0"/>
               </a:rPr>
-              <a:t>&lt;speaker-discussion&gt;</a:t>
-            </a:r>
+              <a:t>&lt;speaker-discussion</a:t>
+            </a:r>
+            <a:r>
+              <a:rPr lang="en-US" sz="1400" dirty="0" smtClean="0">
+                <a:latin typeface="Consolas" panose="020B0609020204030204" pitchFamily="49" charset="0"/>
+                <a:cs typeface="Consolas" panose="020B0609020204030204" pitchFamily="49" charset="0"/>
+              </a:rPr>
+              <a:t>&gt;</a:t>
+            </a:r>
+            <a:br>
+              <a:rPr lang="en-US" sz="1400" dirty="0" smtClean="0">
+                <a:latin typeface="Consolas" panose="020B0609020204030204" pitchFamily="49" charset="0"/>
+                <a:cs typeface="Consolas" panose="020B0609020204030204" pitchFamily="49" charset="0"/>
+              </a:rPr>
+            </a:br>
+            <a:r>
+              <a:rPr lang="en-US" sz="1400" i="1" dirty="0">
+                <a:cs typeface="Consolas" panose="020B0609020204030204" pitchFamily="49" charset="0"/>
+              </a:rPr>
+              <a:t>(top level </a:t>
+            </a:r>
+            <a:r>
+              <a:rPr lang="en-US" sz="1400" i="1" dirty="0" smtClean="0">
+                <a:cs typeface="Consolas" panose="020B0609020204030204" pitchFamily="49" charset="0"/>
+              </a:rPr>
+              <a:t>component)</a:t>
+            </a:r>
+            <a:endParaRPr lang="en-US" sz="1400" i="1" dirty="0">
+              <a:cs typeface="Consolas" panose="020B0609020204030204" pitchFamily="49" charset="0"/>
+            </a:endParaRPr>
           </a:p>
         </p:txBody>
       </p:sp>
@@ -3595,8 +3623,8 @@
         </p:nvSpPr>
         <p:spPr>
           <a:xfrm>
-            <a:off x="1549178" y="1130406"/>
-            <a:ext cx="2520565" cy="381663"/>
+            <a:off x="1549178" y="1237500"/>
+            <a:ext cx="2520565" cy="524245"/>
           </a:xfrm>
           <a:prstGeom prst="roundRect">
             <a:avLst/>
@@ -3626,8 +3654,30 @@
                 <a:latin typeface="Consolas" panose="020B0609020204030204" pitchFamily="49" charset="0"/>
                 <a:cs typeface="Consolas" panose="020B0609020204030204" pitchFamily="49" charset="0"/>
               </a:rPr>
-              <a:t>&lt;speaker-profile&gt;</a:t>
-            </a:r>
+              <a:t>&lt;speaker-profile</a:t>
+            </a:r>
+            <a:r>
+              <a:rPr lang="en-US" sz="1400" dirty="0" smtClean="0">
+                <a:latin typeface="Consolas" panose="020B0609020204030204" pitchFamily="49" charset="0"/>
+                <a:cs typeface="Consolas" panose="020B0609020204030204" pitchFamily="49" charset="0"/>
+              </a:rPr>
+              <a:t>&gt;</a:t>
+            </a:r>
+            <a:br>
+              <a:rPr lang="en-US" sz="1400" dirty="0" smtClean="0">
+                <a:latin typeface="Consolas" panose="020B0609020204030204" pitchFamily="49" charset="0"/>
+                <a:cs typeface="Consolas" panose="020B0609020204030204" pitchFamily="49" charset="0"/>
+              </a:rPr>
+            </a:br>
+            <a:r>
+              <a:rPr lang="en-US" sz="1400" i="1" dirty="0" smtClean="0">
+                <a:cs typeface="Consolas" panose="020B0609020204030204" pitchFamily="49" charset="0"/>
+              </a:rPr>
+              <a:t>(user settings)</a:t>
+            </a:r>
+            <a:endParaRPr lang="en-US" sz="1400" i="1" dirty="0">
+              <a:cs typeface="Consolas" panose="020B0609020204030204" pitchFamily="49" charset="0"/>
+            </a:endParaRPr>
           </a:p>
         </p:txBody>
       </p:sp>
@@ -3639,8 +3689,8 @@
         </p:nvSpPr>
         <p:spPr>
           <a:xfrm>
-            <a:off x="4564047" y="1130407"/>
-            <a:ext cx="2520565" cy="381663"/>
+            <a:off x="4564047" y="1237500"/>
+            <a:ext cx="2520565" cy="528679"/>
           </a:xfrm>
           <a:prstGeom prst="roundRect">
             <a:avLst/>
@@ -3670,8 +3720,30 @@
                 <a:latin typeface="Consolas" panose="020B0609020204030204" pitchFamily="49" charset="0"/>
                 <a:cs typeface="Consolas" panose="020B0609020204030204" pitchFamily="49" charset="0"/>
               </a:rPr>
-              <a:t>&lt;speaker-thread-view&gt;</a:t>
-            </a:r>
+              <a:t>&lt;speaker-thread-view</a:t>
+            </a:r>
+            <a:r>
+              <a:rPr lang="en-US" sz="1400" dirty="0" smtClean="0">
+                <a:latin typeface="Consolas" panose="020B0609020204030204" pitchFamily="49" charset="0"/>
+                <a:cs typeface="Consolas" panose="020B0609020204030204" pitchFamily="49" charset="0"/>
+              </a:rPr>
+              <a:t>&gt;</a:t>
+            </a:r>
+            <a:br>
+              <a:rPr lang="en-US" sz="1400" dirty="0" smtClean="0">
+                <a:latin typeface="Consolas" panose="020B0609020204030204" pitchFamily="49" charset="0"/>
+                <a:cs typeface="Consolas" panose="020B0609020204030204" pitchFamily="49" charset="0"/>
+              </a:rPr>
+            </a:br>
+            <a:r>
+              <a:rPr lang="en-US" sz="1400" i="1" dirty="0" smtClean="0">
+                <a:cs typeface="Consolas" panose="020B0609020204030204" pitchFamily="49" charset="0"/>
+              </a:rPr>
+              <a:t>(contains entire thread)</a:t>
+            </a:r>
+            <a:endParaRPr lang="en-US" sz="1400" i="1" dirty="0">
+              <a:cs typeface="Consolas" panose="020B0609020204030204" pitchFamily="49" charset="0"/>
+            </a:endParaRPr>
           </a:p>
         </p:txBody>
       </p:sp>
@@ -3683,8 +3755,8 @@
         </p:nvSpPr>
         <p:spPr>
           <a:xfrm>
-            <a:off x="7578916" y="1130407"/>
-            <a:ext cx="2520565" cy="381663"/>
+            <a:off x="7578916" y="1237500"/>
+            <a:ext cx="2520565" cy="528677"/>
           </a:xfrm>
           <a:prstGeom prst="roundRect">
             <a:avLst/>
@@ -3714,8 +3786,30 @@
                 <a:latin typeface="Consolas" panose="020B0609020204030204" pitchFamily="49" charset="0"/>
                 <a:cs typeface="Consolas" panose="020B0609020204030204" pitchFamily="49" charset="0"/>
               </a:rPr>
-              <a:t>&lt;speaker-i18next&gt;</a:t>
-            </a:r>
+              <a:t>&lt;speaker-i18next</a:t>
+            </a:r>
+            <a:r>
+              <a:rPr lang="en-US" sz="1400" dirty="0" smtClean="0">
+                <a:latin typeface="Consolas" panose="020B0609020204030204" pitchFamily="49" charset="0"/>
+                <a:cs typeface="Consolas" panose="020B0609020204030204" pitchFamily="49" charset="0"/>
+              </a:rPr>
+              <a:t>&gt;</a:t>
+            </a:r>
+            <a:br>
+              <a:rPr lang="en-US" sz="1400" dirty="0" smtClean="0">
+                <a:latin typeface="Consolas" panose="020B0609020204030204" pitchFamily="49" charset="0"/>
+                <a:cs typeface="Consolas" panose="020B0609020204030204" pitchFamily="49" charset="0"/>
+              </a:rPr>
+            </a:br>
+            <a:r>
+              <a:rPr lang="en-US" sz="1400" i="1" dirty="0" smtClean="0">
+                <a:cs typeface="Consolas" panose="020B0609020204030204" pitchFamily="49" charset="0"/>
+              </a:rPr>
+              <a:t>(translation helper)</a:t>
+            </a:r>
+            <a:endParaRPr lang="en-US" sz="1400" i="1" dirty="0">
+              <a:cs typeface="Consolas" panose="020B0609020204030204" pitchFamily="49" charset="0"/>
+            </a:endParaRPr>
           </a:p>
         </p:txBody>
       </p:sp>
@@ -3771,7 +3865,7 @@
         </p:nvSpPr>
         <p:spPr>
           <a:xfrm>
-            <a:off x="4691269" y="2474180"/>
+            <a:off x="4600651" y="2474180"/>
             <a:ext cx="2520565" cy="565582"/>
           </a:xfrm>
           <a:prstGeom prst="roundRect">
@@ -4156,8 +4250,17 @@
               <a:rPr lang="en-US" sz="1400" i="1" dirty="0" smtClean="0">
                 <a:cs typeface="Consolas" panose="020B0609020204030204" pitchFamily="49" charset="0"/>
               </a:rPr>
-              <a:t>(replies)</a:t>
-            </a:r>
+              <a:t>(</a:t>
+            </a:r>
+            <a:r>
+              <a:rPr lang="en-US" sz="1400" i="1" dirty="0" smtClean="0">
+                <a:cs typeface="Consolas" panose="020B0609020204030204" pitchFamily="49" charset="0"/>
+              </a:rPr>
+              <a:t>replies to post 2)</a:t>
+            </a:r>
+            <a:endParaRPr lang="en-US" sz="1400" i="1" dirty="0" smtClean="0">
+              <a:cs typeface="Consolas" panose="020B0609020204030204" pitchFamily="49" charset="0"/>
+            </a:endParaRPr>
           </a:p>
         </p:txBody>
       </p:sp>
@@ -4208,8 +4311,8 @@
         </p:nvCxnSpPr>
         <p:spPr>
           <a:xfrm>
-            <a:off x="5824330" y="707666"/>
-            <a:ext cx="0" cy="422741"/>
+            <a:off x="5824330" y="826699"/>
+            <a:ext cx="0" cy="410801"/>
           </a:xfrm>
           <a:prstGeom prst="line">
             <a:avLst/>
@@ -4239,12 +4342,89 @@
         </p:nvGrpSpPr>
         <p:grpSpPr>
           <a:xfrm>
-            <a:off x="2809461" y="707666"/>
-            <a:ext cx="6239838" cy="5498701"/>
-            <a:chOff x="2809461" y="707666"/>
-            <a:chExt cx="6239838" cy="5498701"/>
+            <a:off x="2809460" y="826699"/>
+            <a:ext cx="6274904" cy="5379668"/>
+            <a:chOff x="2809460" y="826699"/>
+            <a:chExt cx="6274904" cy="5379668"/>
           </a:xfrm>
         </p:grpSpPr>
+        <p:cxnSp>
+          <p:nvCxnSpPr>
+            <p:cNvPr id="51" name="Straight Connector 50"/>
+            <p:cNvCxnSpPr>
+              <a:stCxn id="13" idx="0"/>
+              <a:endCxn id="12" idx="2"/>
+            </p:cNvCxnSpPr>
+            <p:nvPr/>
+          </p:nvCxnSpPr>
+          <p:spPr>
+            <a:xfrm flipV="1">
+              <a:off x="7532530" y="4758818"/>
+              <a:ext cx="1" cy="487681"/>
+            </a:xfrm>
+            <a:prstGeom prst="line">
+              <a:avLst/>
+            </a:prstGeom>
+            <a:ln w="28575">
+              <a:solidFill>
+                <a:schemeClr val="bg2">
+                  <a:lumMod val="50000"/>
+                </a:schemeClr>
+              </a:solidFill>
+            </a:ln>
+          </p:spPr>
+          <p:style>
+            <a:lnRef idx="1">
+              <a:schemeClr val="dk1"/>
+            </a:lnRef>
+            <a:fillRef idx="0">
+              <a:schemeClr val="dk1"/>
+            </a:fillRef>
+            <a:effectRef idx="0">
+              <a:schemeClr val="dk1"/>
+            </a:effectRef>
+            <a:fontRef idx="minor">
+              <a:schemeClr val="tx1"/>
+            </a:fontRef>
+          </p:style>
+        </p:cxnSp>
+        <p:cxnSp>
+          <p:nvCxnSpPr>
+            <p:cNvPr id="54" name="Straight Connector 53"/>
+            <p:cNvCxnSpPr/>
+            <p:nvPr/>
+          </p:nvCxnSpPr>
+          <p:spPr>
+            <a:xfrm flipV="1">
+              <a:off x="7531556" y="5935611"/>
+              <a:ext cx="973" cy="270756"/>
+            </a:xfrm>
+            <a:prstGeom prst="line">
+              <a:avLst/>
+            </a:prstGeom>
+            <a:ln w="28575">
+              <a:solidFill>
+                <a:schemeClr val="bg2">
+                  <a:lumMod val="50000"/>
+                </a:schemeClr>
+              </a:solidFill>
+            </a:ln>
+          </p:spPr>
+          <p:style>
+            <a:lnRef idx="1">
+              <a:schemeClr val="dk1"/>
+            </a:lnRef>
+            <a:fillRef idx="0">
+              <a:schemeClr val="dk1"/>
+            </a:fillRef>
+            <a:effectRef idx="0">
+              <a:schemeClr val="dk1"/>
+            </a:effectRef>
+            <a:fontRef idx="minor">
+              <a:schemeClr val="tx1"/>
+            </a:fontRef>
+          </p:style>
+        </p:cxnSp>
         <p:grpSp>
           <p:nvGrpSpPr>
             <p:cNvPr id="61" name="Group 60"/>
@@ -4253,10 +4433,10 @@
           </p:nvGrpSpPr>
           <p:grpSpPr>
             <a:xfrm>
-              <a:off x="2809461" y="707666"/>
-              <a:ext cx="6239838" cy="3385892"/>
-              <a:chOff x="2809461" y="707666"/>
-              <a:chExt cx="6239838" cy="3385892"/>
+              <a:off x="2809460" y="826699"/>
+              <a:ext cx="6274904" cy="3266859"/>
+              <a:chOff x="2809460" y="826699"/>
+              <a:chExt cx="6274904" cy="3266859"/>
             </a:xfrm>
           </p:grpSpPr>
           <p:cxnSp>
@@ -4269,8 +4449,8 @@
             </p:nvCxnSpPr>
             <p:spPr>
               <a:xfrm flipH="1">
-                <a:off x="3558747" y="707666"/>
-                <a:ext cx="2265583" cy="422740"/>
+                <a:off x="2809460" y="826699"/>
+                <a:ext cx="3014870" cy="416887"/>
               </a:xfrm>
               <a:prstGeom prst="line">
                 <a:avLst/>
@@ -4309,8 +4489,8 @@
             </p:nvCxnSpPr>
             <p:spPr>
               <a:xfrm>
-                <a:off x="5824330" y="707666"/>
-                <a:ext cx="3014869" cy="422741"/>
+                <a:off x="5824330" y="826699"/>
+                <a:ext cx="3014869" cy="410801"/>
               </a:xfrm>
               <a:prstGeom prst="line">
                 <a:avLst/>
@@ -4349,48 +4529,8 @@
             </p:nvCxnSpPr>
             <p:spPr>
               <a:xfrm flipH="1">
-                <a:off x="2898250" y="1512070"/>
-                <a:ext cx="2926080" cy="962110"/>
-              </a:xfrm>
-              <a:prstGeom prst="line">
-                <a:avLst/>
-              </a:prstGeom>
-              <a:ln w="28575">
-                <a:solidFill>
-                  <a:schemeClr val="bg2">
-                    <a:lumMod val="50000"/>
-                  </a:schemeClr>
-                </a:solidFill>
-              </a:ln>
-            </p:spPr>
-            <p:style>
-              <a:lnRef idx="1">
-                <a:schemeClr val="dk1"/>
-              </a:lnRef>
-              <a:fillRef idx="0">
-                <a:schemeClr val="dk1"/>
-              </a:fillRef>
-              <a:effectRef idx="0">
-                <a:schemeClr val="dk1"/>
-              </a:effectRef>
-              <a:fontRef idx="minor">
-                <a:schemeClr val="tx1"/>
-              </a:fontRef>
-            </p:style>
-          </p:cxnSp>
-          <p:cxnSp>
-            <p:nvCxnSpPr>
-              <p:cNvPr id="28" name="Straight Connector 27"/>
-              <p:cNvCxnSpPr>
-                <a:stCxn id="5" idx="2"/>
-                <a:endCxn id="8" idx="0"/>
-              </p:cNvCxnSpPr>
-              <p:nvPr/>
-            </p:nvCxnSpPr>
-            <p:spPr>
-              <a:xfrm>
-                <a:off x="5824330" y="1512070"/>
-                <a:ext cx="127222" cy="962110"/>
+                <a:off x="2898250" y="1766179"/>
+                <a:ext cx="2926080" cy="708001"/>
               </a:xfrm>
               <a:prstGeom prst="line">
                 <a:avLst/>
@@ -4423,13 +4563,14 @@
               <p:cNvPr id="31" name="Straight Connector 30"/>
               <p:cNvCxnSpPr>
                 <a:stCxn id="5" idx="2"/>
+                <a:endCxn id="9" idx="0"/>
               </p:cNvCxnSpPr>
               <p:nvPr/>
             </p:nvCxnSpPr>
             <p:spPr>
               <a:xfrm>
-                <a:off x="5824330" y="1512070"/>
-                <a:ext cx="3224969" cy="941570"/>
+                <a:off x="5824330" y="1766179"/>
+                <a:ext cx="3260034" cy="708000"/>
               </a:xfrm>
               <a:prstGeom prst="line">
                 <a:avLst/>
@@ -4509,7 +4650,7 @@
             <p:spPr>
               <a:xfrm flipH="1">
                 <a:off x="4243347" y="3039762"/>
-                <a:ext cx="1708205" cy="1053796"/>
+                <a:ext cx="1617587" cy="1053796"/>
               </a:xfrm>
               <a:prstGeom prst="line">
                 <a:avLst/>
@@ -4548,8 +4689,48 @@
             </p:nvCxnSpPr>
             <p:spPr>
               <a:xfrm>
-                <a:off x="5951552" y="3039762"/>
-                <a:ext cx="1580979" cy="1053796"/>
+                <a:off x="5860934" y="3039762"/>
+                <a:ext cx="1671597" cy="1053796"/>
+              </a:xfrm>
+              <a:prstGeom prst="line">
+                <a:avLst/>
+              </a:prstGeom>
+              <a:ln w="28575">
+                <a:solidFill>
+                  <a:schemeClr val="bg2">
+                    <a:lumMod val="50000"/>
+                  </a:schemeClr>
+                </a:solidFill>
+              </a:ln>
+            </p:spPr>
+            <p:style>
+              <a:lnRef idx="1">
+                <a:schemeClr val="dk1"/>
+              </a:lnRef>
+              <a:fillRef idx="0">
+                <a:schemeClr val="dk1"/>
+              </a:fillRef>
+              <a:effectRef idx="0">
+                <a:schemeClr val="dk1"/>
+              </a:effectRef>
+              <a:fontRef idx="minor">
+                <a:schemeClr val="tx1"/>
+              </a:fontRef>
+            </p:style>
+          </p:cxnSp>
+          <p:cxnSp>
+            <p:nvCxnSpPr>
+              <p:cNvPr id="28" name="Straight Connector 27"/>
+              <p:cNvCxnSpPr>
+                <a:stCxn id="5" idx="2"/>
+                <a:endCxn id="8" idx="0"/>
+              </p:cNvCxnSpPr>
+              <p:nvPr/>
+            </p:nvCxnSpPr>
+            <p:spPr>
+              <a:xfrm>
+                <a:off x="5824330" y="1766179"/>
+                <a:ext cx="36604" cy="708001"/>
               </a:xfrm>
               <a:prstGeom prst="line">
                 <a:avLst/>
@@ -4578,83 +4759,6 @@
             </p:style>
           </p:cxnSp>
         </p:grpSp>
-        <p:cxnSp>
-          <p:nvCxnSpPr>
-            <p:cNvPr id="51" name="Straight Connector 50"/>
-            <p:cNvCxnSpPr>
-              <a:stCxn id="13" idx="0"/>
-              <a:endCxn id="12" idx="2"/>
-            </p:cNvCxnSpPr>
-            <p:nvPr/>
-          </p:nvCxnSpPr>
-          <p:spPr>
-            <a:xfrm flipV="1">
-              <a:off x="7532530" y="4758818"/>
-              <a:ext cx="1" cy="487681"/>
-            </a:xfrm>
-            <a:prstGeom prst="line">
-              <a:avLst/>
-            </a:prstGeom>
-            <a:ln w="28575">
-              <a:solidFill>
-                <a:schemeClr val="bg2">
-                  <a:lumMod val="50000"/>
-                </a:schemeClr>
-              </a:solidFill>
-            </a:ln>
-          </p:spPr>
-          <p:style>
-            <a:lnRef idx="1">
-              <a:schemeClr val="dk1"/>
-            </a:lnRef>
-            <a:fillRef idx="0">
-              <a:schemeClr val="dk1"/>
-            </a:fillRef>
-            <a:effectRef idx="0">
-              <a:schemeClr val="dk1"/>
-            </a:effectRef>
-            <a:fontRef idx="minor">
-              <a:schemeClr val="tx1"/>
-            </a:fontRef>
-          </p:style>
-        </p:cxnSp>
-        <p:cxnSp>
-          <p:nvCxnSpPr>
-            <p:cNvPr id="54" name="Straight Connector 53"/>
-            <p:cNvCxnSpPr/>
-            <p:nvPr/>
-          </p:nvCxnSpPr>
-          <p:spPr>
-            <a:xfrm flipV="1">
-              <a:off x="7531556" y="5935611"/>
-              <a:ext cx="973" cy="270756"/>
-            </a:xfrm>
-            <a:prstGeom prst="line">
-              <a:avLst/>
-            </a:prstGeom>
-            <a:ln w="28575">
-              <a:solidFill>
-                <a:schemeClr val="bg2">
-                  <a:lumMod val="50000"/>
-                </a:schemeClr>
-              </a:solidFill>
-            </a:ln>
-          </p:spPr>
-          <p:style>
-            <a:lnRef idx="1">
-              <a:schemeClr val="dk1"/>
-            </a:lnRef>
-            <a:fillRef idx="0">
-              <a:schemeClr val="dk1"/>
-            </a:fillRef>
-            <a:effectRef idx="0">
-              <a:schemeClr val="dk1"/>
-            </a:effectRef>
-            <a:fontRef idx="minor">
-              <a:schemeClr val="tx1"/>
-            </a:fontRef>
-          </p:style>
-        </p:cxnSp>
       </p:grpSp>
       <p:grpSp>
         <p:nvGrpSpPr>

</xml_diff>

<commit_message>
Small formatting cleanup and improve the components figure in ch. 4.
</commit_message>
<xml_diff>
--- a/figures.pptx
+++ b/figures.pptx
@@ -245,7 +245,7 @@
           <a:p>
             <a:fld id="{BBC8513F-113F-4BCE-92C2-45ABCAB37C51}" type="datetimeFigureOut">
               <a:rPr lang="en-US" smtClean="0"/>
-              <a:t>3/28/2015</a:t>
+              <a:t>3/29/2015</a:t>
             </a:fld>
             <a:endParaRPr lang="en-US"/>
           </a:p>
@@ -415,7 +415,7 @@
           <a:p>
             <a:fld id="{BBC8513F-113F-4BCE-92C2-45ABCAB37C51}" type="datetimeFigureOut">
               <a:rPr lang="en-US" smtClean="0"/>
-              <a:t>3/28/2015</a:t>
+              <a:t>3/29/2015</a:t>
             </a:fld>
             <a:endParaRPr lang="en-US"/>
           </a:p>
@@ -595,7 +595,7 @@
           <a:p>
             <a:fld id="{BBC8513F-113F-4BCE-92C2-45ABCAB37C51}" type="datetimeFigureOut">
               <a:rPr lang="en-US" smtClean="0"/>
-              <a:t>3/28/2015</a:t>
+              <a:t>3/29/2015</a:t>
             </a:fld>
             <a:endParaRPr lang="en-US"/>
           </a:p>
@@ -765,7 +765,7 @@
           <a:p>
             <a:fld id="{BBC8513F-113F-4BCE-92C2-45ABCAB37C51}" type="datetimeFigureOut">
               <a:rPr lang="en-US" smtClean="0"/>
-              <a:t>3/28/2015</a:t>
+              <a:t>3/29/2015</a:t>
             </a:fld>
             <a:endParaRPr lang="en-US"/>
           </a:p>
@@ -1011,7 +1011,7 @@
           <a:p>
             <a:fld id="{BBC8513F-113F-4BCE-92C2-45ABCAB37C51}" type="datetimeFigureOut">
               <a:rPr lang="en-US" smtClean="0"/>
-              <a:t>3/28/2015</a:t>
+              <a:t>3/29/2015</a:t>
             </a:fld>
             <a:endParaRPr lang="en-US"/>
           </a:p>
@@ -1243,7 +1243,7 @@
           <a:p>
             <a:fld id="{BBC8513F-113F-4BCE-92C2-45ABCAB37C51}" type="datetimeFigureOut">
               <a:rPr lang="en-US" smtClean="0"/>
-              <a:t>3/28/2015</a:t>
+              <a:t>3/29/2015</a:t>
             </a:fld>
             <a:endParaRPr lang="en-US"/>
           </a:p>
@@ -1610,7 +1610,7 @@
           <a:p>
             <a:fld id="{BBC8513F-113F-4BCE-92C2-45ABCAB37C51}" type="datetimeFigureOut">
               <a:rPr lang="en-US" smtClean="0"/>
-              <a:t>3/28/2015</a:t>
+              <a:t>3/29/2015</a:t>
             </a:fld>
             <a:endParaRPr lang="en-US"/>
           </a:p>
@@ -1728,7 +1728,7 @@
           <a:p>
             <a:fld id="{BBC8513F-113F-4BCE-92C2-45ABCAB37C51}" type="datetimeFigureOut">
               <a:rPr lang="en-US" smtClean="0"/>
-              <a:t>3/28/2015</a:t>
+              <a:t>3/29/2015</a:t>
             </a:fld>
             <a:endParaRPr lang="en-US"/>
           </a:p>
@@ -1823,7 +1823,7 @@
           <a:p>
             <a:fld id="{BBC8513F-113F-4BCE-92C2-45ABCAB37C51}" type="datetimeFigureOut">
               <a:rPr lang="en-US" smtClean="0"/>
-              <a:t>3/28/2015</a:t>
+              <a:t>3/29/2015</a:t>
             </a:fld>
             <a:endParaRPr lang="en-US"/>
           </a:p>
@@ -2100,7 +2100,7 @@
           <a:p>
             <a:fld id="{BBC8513F-113F-4BCE-92C2-45ABCAB37C51}" type="datetimeFigureOut">
               <a:rPr lang="en-US" smtClean="0"/>
-              <a:t>3/28/2015</a:t>
+              <a:t>3/29/2015</a:t>
             </a:fld>
             <a:endParaRPr lang="en-US"/>
           </a:p>
@@ -2353,7 +2353,7 @@
           <a:p>
             <a:fld id="{BBC8513F-113F-4BCE-92C2-45ABCAB37C51}" type="datetimeFigureOut">
               <a:rPr lang="en-US" smtClean="0"/>
-              <a:t>3/28/2015</a:t>
+              <a:t>3/29/2015</a:t>
             </a:fld>
             <a:endParaRPr lang="en-US"/>
           </a:p>
@@ -2566,7 +2566,7 @@
           <a:p>
             <a:fld id="{BBC8513F-113F-4BCE-92C2-45ABCAB37C51}" type="datetimeFigureOut">
               <a:rPr lang="en-US" smtClean="0"/>
-              <a:t>3/28/2015</a:t>
+              <a:t>3/29/2015</a:t>
             </a:fld>
             <a:endParaRPr lang="en-US"/>
           </a:p>
@@ -3113,8 +3113,8 @@
               </p:nvCxnSpPr>
               <p:spPr>
                 <a:xfrm flipH="1">
-                  <a:off x="4293705" y="1614115"/>
-                  <a:ext cx="572493" cy="254442"/>
+                  <a:off x="4204852" y="1641824"/>
+                  <a:ext cx="564367" cy="226733"/>
                 </a:xfrm>
                 <a:prstGeom prst="straightConnector1">
                   <a:avLst/>
@@ -3146,7 +3146,7 @@
               </p:nvSpPr>
               <p:spPr>
                 <a:xfrm>
-                  <a:off x="4794635" y="1336359"/>
+                  <a:off x="4669947" y="1364068"/>
                   <a:ext cx="1359673" cy="338554"/>
                 </a:xfrm>
                 <a:prstGeom prst="rect">
@@ -3467,16 +3467,22 @@
             <a:lstStyle/>
             <a:p>
               <a:r>
-                <a:rPr lang="en-US" sz="4000" b="1" dirty="0" smtClean="0">
+                <a:rPr lang="en-US" sz="4000" dirty="0" smtClean="0">
                   <a:solidFill>
-                    <a:srgbClr val="FF0000"/>
+                    <a:schemeClr val="accent1">
+                      <a:lumMod val="60000"/>
+                      <a:lumOff val="40000"/>
+                    </a:schemeClr>
                   </a:solidFill>
                 </a:rPr>
                 <a:t>}</a:t>
               </a:r>
-              <a:endParaRPr lang="en-US" sz="4000" b="1" dirty="0">
+              <a:endParaRPr lang="en-US" sz="4000" dirty="0">
                 <a:solidFill>
-                  <a:srgbClr val="FF0000"/>
+                  <a:schemeClr val="accent1">
+                    <a:lumMod val="60000"/>
+                    <a:lumOff val="40000"/>
+                  </a:schemeClr>
                 </a:solidFill>
               </a:endParaRPr>
             </a:p>
@@ -3505,10 +3511,20 @@
             <a:lstStyle/>
             <a:p>
               <a:r>
-                <a:rPr lang="en-US" sz="1600" dirty="0" smtClean="0"/>
-                <a:t>Key Structure</a:t>
+                <a:rPr lang="en-US" sz="1600" dirty="0" smtClean="0">
+                  <a:latin typeface="Arial Narrow" panose="020B0606020202030204" pitchFamily="34" charset="0"/>
+                </a:rPr>
+                <a:t>Key </a:t>
               </a:r>
-              <a:endParaRPr lang="en-US" sz="1600" dirty="0"/>
+              <a:r>
+                <a:rPr lang="en-US" sz="1600" dirty="0" smtClean="0">
+                  <a:latin typeface="Arial Narrow" panose="020B0606020202030204" pitchFamily="34" charset="0"/>
+                </a:rPr>
+                <a:t>Structure</a:t>
+              </a:r>
+              <a:endParaRPr lang="en-US" sz="1600" dirty="0">
+                <a:latin typeface="Arial Narrow" panose="020B0606020202030204" pitchFamily="34" charset="0"/>
+              </a:endParaRPr>
             </a:p>
           </p:txBody>
         </p:sp>
@@ -3582,14 +3598,7 @@
                 <a:latin typeface="Consolas" panose="020B0609020204030204" pitchFamily="49" charset="0"/>
                 <a:cs typeface="Consolas" panose="020B0609020204030204" pitchFamily="49" charset="0"/>
               </a:rPr>
-              <a:t>&lt;speaker-discussion</a:t>
-            </a:r>
-            <a:r>
-              <a:rPr lang="en-US" sz="1400" dirty="0" smtClean="0">
-                <a:latin typeface="Consolas" panose="020B0609020204030204" pitchFamily="49" charset="0"/>
-                <a:cs typeface="Consolas" panose="020B0609020204030204" pitchFamily="49" charset="0"/>
-              </a:rPr>
-              <a:t>&gt;</a:t>
+              <a:t>&lt;speaker-discussion&gt;</a:t>
             </a:r>
             <a:br>
               <a:rPr lang="en-US" sz="1400" dirty="0" smtClean="0">
@@ -3654,14 +3663,7 @@
                 <a:latin typeface="Consolas" panose="020B0609020204030204" pitchFamily="49" charset="0"/>
                 <a:cs typeface="Consolas" panose="020B0609020204030204" pitchFamily="49" charset="0"/>
               </a:rPr>
-              <a:t>&lt;speaker-profile</a:t>
-            </a:r>
-            <a:r>
-              <a:rPr lang="en-US" sz="1400" dirty="0" smtClean="0">
-                <a:latin typeface="Consolas" panose="020B0609020204030204" pitchFamily="49" charset="0"/>
-                <a:cs typeface="Consolas" panose="020B0609020204030204" pitchFamily="49" charset="0"/>
-              </a:rPr>
-              <a:t>&gt;</a:t>
+              <a:t>&lt;speaker-profile&gt;</a:t>
             </a:r>
             <a:br>
               <a:rPr lang="en-US" sz="1400" dirty="0" smtClean="0">
@@ -3720,14 +3722,7 @@
                 <a:latin typeface="Consolas" panose="020B0609020204030204" pitchFamily="49" charset="0"/>
                 <a:cs typeface="Consolas" panose="020B0609020204030204" pitchFamily="49" charset="0"/>
               </a:rPr>
-              <a:t>&lt;speaker-thread-view</a:t>
-            </a:r>
-            <a:r>
-              <a:rPr lang="en-US" sz="1400" dirty="0" smtClean="0">
-                <a:latin typeface="Consolas" panose="020B0609020204030204" pitchFamily="49" charset="0"/>
-                <a:cs typeface="Consolas" panose="020B0609020204030204" pitchFamily="49" charset="0"/>
-              </a:rPr>
-              <a:t>&gt;</a:t>
+              <a:t>&lt;speaker-thread-view&gt;</a:t>
             </a:r>
             <a:br>
               <a:rPr lang="en-US" sz="1400" dirty="0" smtClean="0">
@@ -3786,14 +3781,7 @@
                 <a:latin typeface="Consolas" panose="020B0609020204030204" pitchFamily="49" charset="0"/>
                 <a:cs typeface="Consolas" panose="020B0609020204030204" pitchFamily="49" charset="0"/>
               </a:rPr>
-              <a:t>&lt;speaker-i18next</a:t>
-            </a:r>
-            <a:r>
-              <a:rPr lang="en-US" sz="1400" dirty="0" smtClean="0">
-                <a:latin typeface="Consolas" panose="020B0609020204030204" pitchFamily="49" charset="0"/>
-                <a:cs typeface="Consolas" panose="020B0609020204030204" pitchFamily="49" charset="0"/>
-              </a:rPr>
-              <a:t>&gt;</a:t>
+              <a:t>&lt;speaker-i18next&gt;</a:t>
             </a:r>
             <a:br>
               <a:rPr lang="en-US" sz="1400" dirty="0" smtClean="0">
@@ -4250,17 +4238,8 @@
               <a:rPr lang="en-US" sz="1400" i="1" dirty="0" smtClean="0">
                 <a:cs typeface="Consolas" panose="020B0609020204030204" pitchFamily="49" charset="0"/>
               </a:rPr>
-              <a:t>(</a:t>
-            </a:r>
-            <a:r>
-              <a:rPr lang="en-US" sz="1400" i="1" dirty="0" smtClean="0">
-                <a:cs typeface="Consolas" panose="020B0609020204030204" pitchFamily="49" charset="0"/>
-              </a:rPr>
-              <a:t>replies to post 2)</a:t>
-            </a:r>
-            <a:endParaRPr lang="en-US" sz="1400" i="1" dirty="0" smtClean="0">
-              <a:cs typeface="Consolas" panose="020B0609020204030204" pitchFamily="49" charset="0"/>
-            </a:endParaRPr>
+              <a:t>(replies to post 2)</a:t>
+            </a:r>
           </a:p>
         </p:txBody>
       </p:sp>

</xml_diff>